<commit_message>
Updates to mechanical ventilator methodology for VC-AC mode.
</commit_message>
<xml_diff>
--- a/docs/Figures/MechanicalVentilatorWorking.pptx
+++ b/docs/Figures/MechanicalVentilatorWorking.pptx
@@ -304,7 +304,7 @@
             <a:fld id="{1D8BD707-D9CF-40AE-B4C6-C98DA3205C09}" type="datetimeFigureOut">
               <a:rPr lang="en-US" smtClean="0"/>
               <a:pPr/>
-              <a:t>6/4/2020</a:t>
+              <a:t>6/24/2020</a:t>
             </a:fld>
             <a:endParaRPr lang="en-US"/>
           </a:p>
@@ -469,7 +469,7 @@
             <a:fld id="{1D8BD707-D9CF-40AE-B4C6-C98DA3205C09}" type="datetimeFigureOut">
               <a:rPr lang="en-US" smtClean="0"/>
               <a:pPr/>
-              <a:t>6/4/2020</a:t>
+              <a:t>6/24/2020</a:t>
             </a:fld>
             <a:endParaRPr lang="en-US"/>
           </a:p>
@@ -644,7 +644,7 @@
             <a:fld id="{1D8BD707-D9CF-40AE-B4C6-C98DA3205C09}" type="datetimeFigureOut">
               <a:rPr lang="en-US" smtClean="0"/>
               <a:pPr/>
-              <a:t>6/4/2020</a:t>
+              <a:t>6/24/2020</a:t>
             </a:fld>
             <a:endParaRPr lang="en-US"/>
           </a:p>
@@ -809,7 +809,7 @@
             <a:fld id="{1D8BD707-D9CF-40AE-B4C6-C98DA3205C09}" type="datetimeFigureOut">
               <a:rPr lang="en-US" smtClean="0"/>
               <a:pPr/>
-              <a:t>6/4/2020</a:t>
+              <a:t>6/24/2020</a:t>
             </a:fld>
             <a:endParaRPr lang="en-US"/>
           </a:p>
@@ -1051,7 +1051,7 @@
             <a:fld id="{1D8BD707-D9CF-40AE-B4C6-C98DA3205C09}" type="datetimeFigureOut">
               <a:rPr lang="en-US" smtClean="0"/>
               <a:pPr/>
-              <a:t>6/4/2020</a:t>
+              <a:t>6/24/2020</a:t>
             </a:fld>
             <a:endParaRPr lang="en-US"/>
           </a:p>
@@ -1333,7 +1333,7 @@
             <a:fld id="{1D8BD707-D9CF-40AE-B4C6-C98DA3205C09}" type="datetimeFigureOut">
               <a:rPr lang="en-US" smtClean="0"/>
               <a:pPr/>
-              <a:t>6/4/2020</a:t>
+              <a:t>6/24/2020</a:t>
             </a:fld>
             <a:endParaRPr lang="en-US"/>
           </a:p>
@@ -1749,7 +1749,7 @@
             <a:fld id="{1D8BD707-D9CF-40AE-B4C6-C98DA3205C09}" type="datetimeFigureOut">
               <a:rPr lang="en-US" smtClean="0"/>
               <a:pPr/>
-              <a:t>6/4/2020</a:t>
+              <a:t>6/24/2020</a:t>
             </a:fld>
             <a:endParaRPr lang="en-US"/>
           </a:p>
@@ -1863,7 +1863,7 @@
             <a:fld id="{1D8BD707-D9CF-40AE-B4C6-C98DA3205C09}" type="datetimeFigureOut">
               <a:rPr lang="en-US" smtClean="0"/>
               <a:pPr/>
-              <a:t>6/4/2020</a:t>
+              <a:t>6/24/2020</a:t>
             </a:fld>
             <a:endParaRPr lang="en-US"/>
           </a:p>
@@ -1955,7 +1955,7 @@
             <a:fld id="{1D8BD707-D9CF-40AE-B4C6-C98DA3205C09}" type="datetimeFigureOut">
               <a:rPr lang="en-US" smtClean="0"/>
               <a:pPr/>
-              <a:t>6/4/2020</a:t>
+              <a:t>6/24/2020</a:t>
             </a:fld>
             <a:endParaRPr lang="en-US"/>
           </a:p>
@@ -2227,7 +2227,7 @@
             <a:fld id="{1D8BD707-D9CF-40AE-B4C6-C98DA3205C09}" type="datetimeFigureOut">
               <a:rPr lang="en-US" smtClean="0"/>
               <a:pPr/>
-              <a:t>6/4/2020</a:t>
+              <a:t>6/24/2020</a:t>
             </a:fld>
             <a:endParaRPr lang="en-US"/>
           </a:p>
@@ -2476,7 +2476,7 @@
             <a:fld id="{1D8BD707-D9CF-40AE-B4C6-C98DA3205C09}" type="datetimeFigureOut">
               <a:rPr lang="en-US" smtClean="0"/>
               <a:pPr/>
-              <a:t>6/4/2020</a:t>
+              <a:t>6/24/2020</a:t>
             </a:fld>
             <a:endParaRPr lang="en-US"/>
           </a:p>
@@ -2684,7 +2684,7 @@
             <a:fld id="{1D8BD707-D9CF-40AE-B4C6-C98DA3205C09}" type="datetimeFigureOut">
               <a:rPr lang="en-US" smtClean="0"/>
               <a:pPr/>
-              <a:t>6/4/2020</a:t>
+              <a:t>6/24/2020</a:t>
             </a:fld>
             <a:endParaRPr lang="en-US"/>
           </a:p>
@@ -3057,10 +3057,10 @@
       </p:grpSpPr>
       <p:pic>
         <p:nvPicPr>
-          <p:cNvPr id="3" name="Picture 2">
+          <p:cNvPr id="2" name="Picture 1">
             <a:extLst>
               <a:ext uri="{FF2B5EF4-FFF2-40B4-BE49-F238E27FC236}">
-                <a16:creationId xmlns:a16="http://schemas.microsoft.com/office/drawing/2014/main" id="{F8D70760-CEA3-42DE-90BA-C2D061B7E149}"/>
+                <a16:creationId xmlns:a16="http://schemas.microsoft.com/office/drawing/2014/main" id="{089EA18A-CC8B-4FE7-8153-5F1054476D3E}"/>
               </a:ext>
             </a:extLst>
           </p:cNvPr>
@@ -3077,8 +3077,8 @@
         </p:blipFill>
         <p:spPr>
           <a:xfrm>
-            <a:off x="1038370" y="0"/>
-            <a:ext cx="7067259" cy="6858000"/>
+            <a:off x="1132995" y="151942"/>
+            <a:ext cx="6878010" cy="6554115"/>
           </a:xfrm>
           <a:prstGeom prst="rect">
             <a:avLst/>
@@ -3143,7 +3143,7 @@
           <a:graphicData uri="http://schemas.openxmlformats.org/presentationml/2006/ole">
             <mc:AlternateContent xmlns:mc="http://schemas.openxmlformats.org/markup-compatibility/2006">
               <mc:Choice xmlns:v="urn:schemas-microsoft-com:vml" Requires="v">
-                <p:oleObj spid="_x0000_s1028" name="Equation" r:id="rId3" imgW="1295280" imgH="927000" progId="Equation.DSMT4">
+                <p:oleObj spid="_x0000_s1029" name="Equation" r:id="rId3" imgW="1295280" imgH="927000" progId="Equation.DSMT4">
                   <p:embed/>
                 </p:oleObj>
               </mc:Choice>

</xml_diff>

<commit_message>
Updated mechanical ventilator documentation
</commit_message>
<xml_diff>
--- a/docs/Figures/MechanicalVentilatorWorking.pptx
+++ b/docs/Figures/MechanicalVentilatorWorking.pptx
@@ -304,7 +304,7 @@
             <a:fld id="{1D8BD707-D9CF-40AE-B4C6-C98DA3205C09}" type="datetimeFigureOut">
               <a:rPr lang="en-US" smtClean="0"/>
               <a:pPr/>
-              <a:t>6/24/2020</a:t>
+              <a:t>9/13/2021</a:t>
             </a:fld>
             <a:endParaRPr lang="en-US"/>
           </a:p>
@@ -469,7 +469,7 @@
             <a:fld id="{1D8BD707-D9CF-40AE-B4C6-C98DA3205C09}" type="datetimeFigureOut">
               <a:rPr lang="en-US" smtClean="0"/>
               <a:pPr/>
-              <a:t>6/24/2020</a:t>
+              <a:t>9/13/2021</a:t>
             </a:fld>
             <a:endParaRPr lang="en-US"/>
           </a:p>
@@ -644,7 +644,7 @@
             <a:fld id="{1D8BD707-D9CF-40AE-B4C6-C98DA3205C09}" type="datetimeFigureOut">
               <a:rPr lang="en-US" smtClean="0"/>
               <a:pPr/>
-              <a:t>6/24/2020</a:t>
+              <a:t>9/13/2021</a:t>
             </a:fld>
             <a:endParaRPr lang="en-US"/>
           </a:p>
@@ -809,7 +809,7 @@
             <a:fld id="{1D8BD707-D9CF-40AE-B4C6-C98DA3205C09}" type="datetimeFigureOut">
               <a:rPr lang="en-US" smtClean="0"/>
               <a:pPr/>
-              <a:t>6/24/2020</a:t>
+              <a:t>9/13/2021</a:t>
             </a:fld>
             <a:endParaRPr lang="en-US"/>
           </a:p>
@@ -1051,7 +1051,7 @@
             <a:fld id="{1D8BD707-D9CF-40AE-B4C6-C98DA3205C09}" type="datetimeFigureOut">
               <a:rPr lang="en-US" smtClean="0"/>
               <a:pPr/>
-              <a:t>6/24/2020</a:t>
+              <a:t>9/13/2021</a:t>
             </a:fld>
             <a:endParaRPr lang="en-US"/>
           </a:p>
@@ -1333,7 +1333,7 @@
             <a:fld id="{1D8BD707-D9CF-40AE-B4C6-C98DA3205C09}" type="datetimeFigureOut">
               <a:rPr lang="en-US" smtClean="0"/>
               <a:pPr/>
-              <a:t>6/24/2020</a:t>
+              <a:t>9/13/2021</a:t>
             </a:fld>
             <a:endParaRPr lang="en-US"/>
           </a:p>
@@ -1749,7 +1749,7 @@
             <a:fld id="{1D8BD707-D9CF-40AE-B4C6-C98DA3205C09}" type="datetimeFigureOut">
               <a:rPr lang="en-US" smtClean="0"/>
               <a:pPr/>
-              <a:t>6/24/2020</a:t>
+              <a:t>9/13/2021</a:t>
             </a:fld>
             <a:endParaRPr lang="en-US"/>
           </a:p>
@@ -1863,7 +1863,7 @@
             <a:fld id="{1D8BD707-D9CF-40AE-B4C6-C98DA3205C09}" type="datetimeFigureOut">
               <a:rPr lang="en-US" smtClean="0"/>
               <a:pPr/>
-              <a:t>6/24/2020</a:t>
+              <a:t>9/13/2021</a:t>
             </a:fld>
             <a:endParaRPr lang="en-US"/>
           </a:p>
@@ -1955,7 +1955,7 @@
             <a:fld id="{1D8BD707-D9CF-40AE-B4C6-C98DA3205C09}" type="datetimeFigureOut">
               <a:rPr lang="en-US" smtClean="0"/>
               <a:pPr/>
-              <a:t>6/24/2020</a:t>
+              <a:t>9/13/2021</a:t>
             </a:fld>
             <a:endParaRPr lang="en-US"/>
           </a:p>
@@ -2227,7 +2227,7 @@
             <a:fld id="{1D8BD707-D9CF-40AE-B4C6-C98DA3205C09}" type="datetimeFigureOut">
               <a:rPr lang="en-US" smtClean="0"/>
               <a:pPr/>
-              <a:t>6/24/2020</a:t>
+              <a:t>9/13/2021</a:t>
             </a:fld>
             <a:endParaRPr lang="en-US"/>
           </a:p>
@@ -2476,7 +2476,7 @@
             <a:fld id="{1D8BD707-D9CF-40AE-B4C6-C98DA3205C09}" type="datetimeFigureOut">
               <a:rPr lang="en-US" smtClean="0"/>
               <a:pPr/>
-              <a:t>6/24/2020</a:t>
+              <a:t>9/13/2021</a:t>
             </a:fld>
             <a:endParaRPr lang="en-US"/>
           </a:p>
@@ -2684,7 +2684,7 @@
             <a:fld id="{1D8BD707-D9CF-40AE-B4C6-C98DA3205C09}" type="datetimeFigureOut">
               <a:rPr lang="en-US" smtClean="0"/>
               <a:pPr/>
-              <a:t>6/24/2020</a:t>
+              <a:t>9/13/2021</a:t>
             </a:fld>
             <a:endParaRPr lang="en-US"/>
           </a:p>
@@ -3057,10 +3057,10 @@
       </p:grpSpPr>
       <p:pic>
         <p:nvPicPr>
-          <p:cNvPr id="2" name="Picture 1">
+          <p:cNvPr id="3" name="Picture 2">
             <a:extLst>
               <a:ext uri="{FF2B5EF4-FFF2-40B4-BE49-F238E27FC236}">
-                <a16:creationId xmlns:a16="http://schemas.microsoft.com/office/drawing/2014/main" id="{089EA18A-CC8B-4FE7-8153-5F1054476D3E}"/>
+                <a16:creationId xmlns:a16="http://schemas.microsoft.com/office/drawing/2014/main" id="{B79C5A8A-507D-44FA-B7F0-E0E634DC1A29}"/>
               </a:ext>
             </a:extLst>
           </p:cNvPr>
@@ -3077,8 +3077,8 @@
         </p:blipFill>
         <p:spPr>
           <a:xfrm>
-            <a:off x="1132995" y="151942"/>
-            <a:ext cx="6878010" cy="6554115"/>
+            <a:off x="1804601" y="394864"/>
+            <a:ext cx="5534797" cy="6068272"/>
           </a:xfrm>
           <a:prstGeom prst="rect">
             <a:avLst/>
@@ -3143,12 +3143,12 @@
           <a:graphicData uri="http://schemas.openxmlformats.org/presentationml/2006/ole">
             <mc:AlternateContent xmlns:mc="http://schemas.openxmlformats.org/markup-compatibility/2006">
               <mc:Choice xmlns:v="urn:schemas-microsoft-com:vml" Requires="v">
-                <p:oleObj spid="_x0000_s1029" name="Equation" r:id="rId3" imgW="1295280" imgH="927000" progId="Equation.DSMT4">
+                <p:oleObj name="Equation" r:id="rId2" imgW="1295280" imgH="927000" progId="Equation.DSMT4">
                   <p:embed/>
                 </p:oleObj>
               </mc:Choice>
               <mc:Fallback>
-                <p:oleObj name="Equation" r:id="rId3" imgW="1295280" imgH="927000" progId="Equation.DSMT4">
+                <p:oleObj name="Equation" r:id="rId2" imgW="1295280" imgH="927000" progId="Equation.DSMT4">
                   <p:embed/>
                   <p:pic>
                     <p:nvPicPr>
@@ -3157,7 +3157,7 @@
                       <p:nvPr/>
                     </p:nvPicPr>
                     <p:blipFill>
-                      <a:blip r:embed="rId4"/>
+                      <a:blip r:embed="rId3"/>
                       <a:stretch>
                         <a:fillRect/>
                       </a:stretch>

</xml_diff>

<commit_message>
Update mechanical ventilator circuit diagram and methodology report.
(cherry picked from commit 8a6e704db3bc92741c8ecfe6ca21199fe58f4d3c)
</commit_message>
<xml_diff>
--- a/docs/Figures/MechanicalVentilatorWorking.pptx
+++ b/docs/Figures/MechanicalVentilatorWorking.pptx
@@ -304,7 +304,7 @@
             <a:fld id="{1D8BD707-D9CF-40AE-B4C6-C98DA3205C09}" type="datetimeFigureOut">
               <a:rPr lang="en-US" smtClean="0"/>
               <a:pPr/>
-              <a:t>9/13/2021</a:t>
+              <a:t>2/6/2022</a:t>
             </a:fld>
             <a:endParaRPr lang="en-US"/>
           </a:p>
@@ -469,7 +469,7 @@
             <a:fld id="{1D8BD707-D9CF-40AE-B4C6-C98DA3205C09}" type="datetimeFigureOut">
               <a:rPr lang="en-US" smtClean="0"/>
               <a:pPr/>
-              <a:t>9/13/2021</a:t>
+              <a:t>2/6/2022</a:t>
             </a:fld>
             <a:endParaRPr lang="en-US"/>
           </a:p>
@@ -644,7 +644,7 @@
             <a:fld id="{1D8BD707-D9CF-40AE-B4C6-C98DA3205C09}" type="datetimeFigureOut">
               <a:rPr lang="en-US" smtClean="0"/>
               <a:pPr/>
-              <a:t>9/13/2021</a:t>
+              <a:t>2/6/2022</a:t>
             </a:fld>
             <a:endParaRPr lang="en-US"/>
           </a:p>
@@ -809,7 +809,7 @@
             <a:fld id="{1D8BD707-D9CF-40AE-B4C6-C98DA3205C09}" type="datetimeFigureOut">
               <a:rPr lang="en-US" smtClean="0"/>
               <a:pPr/>
-              <a:t>9/13/2021</a:t>
+              <a:t>2/6/2022</a:t>
             </a:fld>
             <a:endParaRPr lang="en-US"/>
           </a:p>
@@ -1051,7 +1051,7 @@
             <a:fld id="{1D8BD707-D9CF-40AE-B4C6-C98DA3205C09}" type="datetimeFigureOut">
               <a:rPr lang="en-US" smtClean="0"/>
               <a:pPr/>
-              <a:t>9/13/2021</a:t>
+              <a:t>2/6/2022</a:t>
             </a:fld>
             <a:endParaRPr lang="en-US"/>
           </a:p>
@@ -1333,7 +1333,7 @@
             <a:fld id="{1D8BD707-D9CF-40AE-B4C6-C98DA3205C09}" type="datetimeFigureOut">
               <a:rPr lang="en-US" smtClean="0"/>
               <a:pPr/>
-              <a:t>9/13/2021</a:t>
+              <a:t>2/6/2022</a:t>
             </a:fld>
             <a:endParaRPr lang="en-US"/>
           </a:p>
@@ -1749,7 +1749,7 @@
             <a:fld id="{1D8BD707-D9CF-40AE-B4C6-C98DA3205C09}" type="datetimeFigureOut">
               <a:rPr lang="en-US" smtClean="0"/>
               <a:pPr/>
-              <a:t>9/13/2021</a:t>
+              <a:t>2/6/2022</a:t>
             </a:fld>
             <a:endParaRPr lang="en-US"/>
           </a:p>
@@ -1863,7 +1863,7 @@
             <a:fld id="{1D8BD707-D9CF-40AE-B4C6-C98DA3205C09}" type="datetimeFigureOut">
               <a:rPr lang="en-US" smtClean="0"/>
               <a:pPr/>
-              <a:t>9/13/2021</a:t>
+              <a:t>2/6/2022</a:t>
             </a:fld>
             <a:endParaRPr lang="en-US"/>
           </a:p>
@@ -1955,7 +1955,7 @@
             <a:fld id="{1D8BD707-D9CF-40AE-B4C6-C98DA3205C09}" type="datetimeFigureOut">
               <a:rPr lang="en-US" smtClean="0"/>
               <a:pPr/>
-              <a:t>9/13/2021</a:t>
+              <a:t>2/6/2022</a:t>
             </a:fld>
             <a:endParaRPr lang="en-US"/>
           </a:p>
@@ -2227,7 +2227,7 @@
             <a:fld id="{1D8BD707-D9CF-40AE-B4C6-C98DA3205C09}" type="datetimeFigureOut">
               <a:rPr lang="en-US" smtClean="0"/>
               <a:pPr/>
-              <a:t>9/13/2021</a:t>
+              <a:t>2/6/2022</a:t>
             </a:fld>
             <a:endParaRPr lang="en-US"/>
           </a:p>
@@ -2476,7 +2476,7 @@
             <a:fld id="{1D8BD707-D9CF-40AE-B4C6-C98DA3205C09}" type="datetimeFigureOut">
               <a:rPr lang="en-US" smtClean="0"/>
               <a:pPr/>
-              <a:t>9/13/2021</a:t>
+              <a:t>2/6/2022</a:t>
             </a:fld>
             <a:endParaRPr lang="en-US"/>
           </a:p>
@@ -2684,7 +2684,7 @@
             <a:fld id="{1D8BD707-D9CF-40AE-B4C6-C98DA3205C09}" type="datetimeFigureOut">
               <a:rPr lang="en-US" smtClean="0"/>
               <a:pPr/>
-              <a:t>9/13/2021</a:t>
+              <a:t>2/6/2022</a:t>
             </a:fld>
             <a:endParaRPr lang="en-US"/>
           </a:p>
@@ -3057,10 +3057,10 @@
       </p:grpSpPr>
       <p:pic>
         <p:nvPicPr>
-          <p:cNvPr id="3" name="Picture 2">
+          <p:cNvPr id="2" name="Picture 1">
             <a:extLst>
               <a:ext uri="{FF2B5EF4-FFF2-40B4-BE49-F238E27FC236}">
-                <a16:creationId xmlns:a16="http://schemas.microsoft.com/office/drawing/2014/main" id="{B79C5A8A-507D-44FA-B7F0-E0E634DC1A29}"/>
+                <a16:creationId xmlns:a16="http://schemas.microsoft.com/office/drawing/2014/main" id="{7EFBE449-0D92-4177-B46B-73E842C65BF0}"/>
               </a:ext>
             </a:extLst>
           </p:cNvPr>
@@ -3077,8 +3077,8 @@
         </p:blipFill>
         <p:spPr>
           <a:xfrm>
-            <a:off x="1804601" y="394864"/>
-            <a:ext cx="5534797" cy="6068272"/>
+            <a:off x="1201615" y="0"/>
+            <a:ext cx="6740769" cy="6858000"/>
           </a:xfrm>
           <a:prstGeom prst="rect">
             <a:avLst/>
@@ -3143,12 +3143,12 @@
           <a:graphicData uri="http://schemas.openxmlformats.org/presentationml/2006/ole">
             <mc:AlternateContent xmlns:mc="http://schemas.openxmlformats.org/markup-compatibility/2006">
               <mc:Choice xmlns:v="urn:schemas-microsoft-com:vml" Requires="v">
-                <p:oleObj name="Equation" r:id="rId2" imgW="1295280" imgH="927000" progId="Equation.DSMT4">
+                <p:oleObj spid="_x0000_s1026" name="Equation" r:id="rId3" imgW="1295280" imgH="927000" progId="Equation.DSMT4">
                   <p:embed/>
                 </p:oleObj>
               </mc:Choice>
               <mc:Fallback>
-                <p:oleObj name="Equation" r:id="rId2" imgW="1295280" imgH="927000" progId="Equation.DSMT4">
+                <p:oleObj name="Equation" r:id="rId3" imgW="1295280" imgH="927000" progId="Equation.DSMT4">
                   <p:embed/>
                   <p:pic>
                     <p:nvPicPr>
@@ -3157,7 +3157,7 @@
                       <p:nvPr/>
                     </p:nvPicPr>
                     <p:blipFill>
-                      <a:blip r:embed="rId3"/>
+                      <a:blip r:embed="rId4"/>
                       <a:stretch>
                         <a:fillRect/>
                       </a:stretch>

</xml_diff>